<commit_message>
Updated the powerpoint for corrections
Signed-off-by: emiliod90 <emiliod90@gmail.com>
</commit_message>
<xml_diff>
--- a/Redkite_presentation.pptx
+++ b/Redkite_presentation.pptx
@@ -117,6 +117,11 @@
       </a:defRPr>
     </a:lvl9pPr>
   </p:defaultTextStyle>
+  <p:extLst>
+    <p:ext uri="{EFAFB233-063F-42B5-8137-9DF3F51BA10A}">
+      <p15:sldGuideLst xmlns:p15="http://schemas.microsoft.com/office/powerpoint/2012/main"/>
+    </p:ext>
+  </p:extLst>
 </p:presentation>
 </file>
 
@@ -7046,7 +7051,7 @@
                   <a:schemeClr val="tx1"/>
                 </a:solidFill>
               </a:rPr>
-              <a:t>Tasked with determining whether the “member get member” referral campaign was a success</a:t>
+              <a:t>Tasked with determining whether the “member get member” referral campaign was a success.</a:t>
             </a:r>
           </a:p>
           <a:p>
@@ -7056,7 +7061,7 @@
                   <a:schemeClr val="tx1"/>
                 </a:solidFill>
               </a:rPr>
-              <a:t>Findings indicate several limitations with the campaign</a:t>
+              <a:t>Findings indicate several limitations with the campaign.</a:t>
             </a:r>
           </a:p>
           <a:p>
@@ -7066,7 +7071,7 @@
                   <a:schemeClr val="tx1"/>
                 </a:solidFill>
               </a:rPr>
-              <a:t>Based on conservative, financial estimates - the cost does not appear to be recouped by the value brought from increased user growth</a:t>
+              <a:t>Based on conservative, financial estimates - the cost does not appear to be recouped by the value brought from increased user growth.</a:t>
             </a:r>
           </a:p>
           <a:p>
@@ -7076,7 +7081,7 @@
                   <a:schemeClr val="tx1"/>
                 </a:solidFill>
               </a:rPr>
-              <a:t>With additional financial information, and a better understanding of our customer groups, several, more insightful campaigns can be conducted</a:t>
+              <a:t>With additional financial information, and a better understanding of our customer groups, several, more insightful campaigns can be conducted.</a:t>
             </a:r>
           </a:p>
         </p:txBody>
@@ -7976,7 +7981,7 @@
                   <a:schemeClr val="tx1"/>
                 </a:solidFill>
               </a:rPr>
-              <a:t> influenced by the ordering decisions</a:t>
+              <a:t> influenced by the ordering decisions of other members.</a:t>
             </a:r>
           </a:p>
           <a:p>
@@ -7987,7 +7992,7 @@
                   <a:schemeClr val="tx1"/>
                 </a:solidFill>
               </a:rPr>
-              <a:t>The sample size is reflective of the population and large enough to conduct statistically significant analysis</a:t>
+              <a:t>The sample size is reflective of the population.</a:t>
             </a:r>
           </a:p>
           <a:p>

</xml_diff>